<commit_message>
add some info in presentation
</commit_message>
<xml_diff>
--- a/theory/presentation.pptx
+++ b/theory/presentation.pptx
@@ -18,21 +18,22 @@
     <p:sldId id="263" r:id="rId13"/>
     <p:sldId id="264" r:id="rId14"/>
     <p:sldId id="265" r:id="rId15"/>
+    <p:sldId id="266" r:id="rId16"/>
   </p:sldIdLst>
   <p:sldSz cy="5143500" cx="9144000"/>
   <p:notesSz cx="6858000" cy="9144000"/>
   <p:embeddedFontLst>
     <p:embeddedFont>
       <p:font typeface="Amatic SC"/>
-      <p:regular r:id="rId16"/>
-      <p:bold r:id="rId17"/>
+      <p:regular r:id="rId17"/>
+      <p:bold r:id="rId18"/>
     </p:embeddedFont>
     <p:embeddedFont>
       <p:font typeface="Source Code Pro"/>
-      <p:regular r:id="rId18"/>
-      <p:bold r:id="rId19"/>
-      <p:italic r:id="rId20"/>
-      <p:boldItalic r:id="rId21"/>
+      <p:regular r:id="rId19"/>
+      <p:bold r:id="rId20"/>
+      <p:italic r:id="rId21"/>
+      <p:boldItalic r:id="rId22"/>
     </p:embeddedFont>
   </p:embeddedFontLst>
   <p:defaultTextStyle>
@@ -813,7 +814,7 @@
   <p:cSld>
     <p:spTree>
       <p:nvGrpSpPr>
-        <p:cNvPr id="119" name="Shape 119"/>
+        <p:cNvPr id="120" name="Shape 120"/>
         <p:cNvGrpSpPr/>
         <p:nvPr/>
       </p:nvGrpSpPr>
@@ -827,7 +828,7 @@
       </p:grpSpPr>
       <p:sp>
         <p:nvSpPr>
-          <p:cNvPr id="120" name="Google Shape;120;g358cb5d9b42_0_23:notes"/>
+          <p:cNvPr id="121" name="Google Shape;121;g30521902cbf_0_117:notes"/>
           <p:cNvSpPr/>
           <p:nvPr>
             <p:ph idx="2" type="sldImg"/>
@@ -862,7 +863,106 @@
       </p:sp>
       <p:sp>
         <p:nvSpPr>
-          <p:cNvPr id="121" name="Google Shape;121;g358cb5d9b42_0_23:notes"/>
+          <p:cNvPr id="122" name="Google Shape;122;g30521902cbf_0_117:notes"/>
+          <p:cNvSpPr txBox="1"/>
+          <p:nvPr>
+            <p:ph idx="1" type="body"/>
+          </p:nvPr>
+        </p:nvSpPr>
+        <p:spPr>
+          <a:xfrm>
+            <a:off x="685800" y="4343400"/>
+            <a:ext cx="5486400" cy="4114800"/>
+          </a:xfrm>
+          <a:prstGeom prst="rect">
+            <a:avLst/>
+          </a:prstGeom>
+        </p:spPr>
+        <p:txBody>
+          <a:bodyPr anchorCtr="0" anchor="t" bIns="91425" lIns="91425" spcFirstLastPara="1" rIns="91425" wrap="square" tIns="91425">
+            <a:noAutofit/>
+          </a:bodyPr>
+          <a:lstStyle/>
+          <a:p>
+            <a:pPr indent="0" lvl="0" marL="0" rtl="0" algn="l">
+              <a:spcBef>
+                <a:spcPts val="0"/>
+              </a:spcBef>
+              <a:spcAft>
+                <a:spcPts val="0"/>
+              </a:spcAft>
+              <a:buNone/>
+            </a:pPr>
+            <a:r>
+              <a:t/>
+            </a:r>
+            <a:endParaRPr/>
+          </a:p>
+        </p:txBody>
+      </p:sp>
+    </p:spTree>
+  </p:cSld>
+  <p:clrMapOvr>
+    <a:masterClrMapping/>
+  </p:clrMapOvr>
+</p:notes>
+</file>
+
+<file path=ppt/notesSlides/notesSlide11.xml><?xml version="1.0" encoding="utf-8"?>
+<p:notes xmlns:a="http://schemas.openxmlformats.org/drawingml/2006/main" xmlns:r="http://schemas.openxmlformats.org/officeDocument/2006/relationships" xmlns:mc="http://schemas.openxmlformats.org/markup-compatibility/2006" xmlns:mv="urn:schemas-microsoft-com:mac:vml" xmlns:p="http://schemas.openxmlformats.org/presentationml/2006/main" xmlns:c="http://schemas.openxmlformats.org/drawingml/2006/chart" xmlns:dgm="http://schemas.openxmlformats.org/drawingml/2006/diagram" xmlns:o="urn:schemas-microsoft-com:office:office" xmlns:v="urn:schemas-microsoft-com:vml" xmlns:pvml="urn:schemas-microsoft-com:office:powerpoint" xmlns:com="http://schemas.openxmlformats.org/drawingml/2006/compatibility" xmlns:p14="http://schemas.microsoft.com/office/powerpoint/2010/main" xmlns:p15="http://schemas.microsoft.com/office/powerpoint/2012/main" xmlns:ahyp="http://schemas.microsoft.com/office/drawing/2018/hyperlinkcolor" showMasterPhAnim="0" showMasterSp="0">
+  <p:cSld>
+    <p:spTree>
+      <p:nvGrpSpPr>
+        <p:cNvPr id="126" name="Shape 126"/>
+        <p:cNvGrpSpPr/>
+        <p:nvPr/>
+      </p:nvGrpSpPr>
+      <p:grpSpPr>
+        <a:xfrm>
+          <a:off x="0" y="0"/>
+          <a:ext cx="0" cy="0"/>
+          <a:chOff x="0" y="0"/>
+          <a:chExt cx="0" cy="0"/>
+        </a:xfrm>
+      </p:grpSpPr>
+      <p:sp>
+        <p:nvSpPr>
+          <p:cNvPr id="127" name="Google Shape;127;g358cb5d9b42_0_23:notes"/>
+          <p:cNvSpPr/>
+          <p:nvPr>
+            <p:ph idx="2" type="sldImg"/>
+          </p:nvPr>
+        </p:nvSpPr>
+        <p:spPr>
+          <a:xfrm>
+            <a:off x="381300" y="685800"/>
+            <a:ext cx="6096000" cy="3429000"/>
+          </a:xfrm>
+          <a:custGeom>
+            <a:rect b="b" l="l" r="r" t="t"/>
+            <a:pathLst>
+              <a:path extrusionOk="0" h="120000" w="120000">
+                <a:moveTo>
+                  <a:pt x="0" y="0"/>
+                </a:moveTo>
+                <a:lnTo>
+                  <a:pt x="120000" y="0"/>
+                </a:lnTo>
+                <a:lnTo>
+                  <a:pt x="120000" y="120000"/>
+                </a:lnTo>
+                <a:lnTo>
+                  <a:pt x="0" y="120000"/>
+                </a:lnTo>
+                <a:close/>
+              </a:path>
+            </a:pathLst>
+          </a:custGeom>
+        </p:spPr>
+      </p:sp>
+      <p:sp>
+        <p:nvSpPr>
+          <p:cNvPr id="128" name="Google Shape;128;g358cb5d9b42_0_23:notes"/>
           <p:cNvSpPr txBox="1"/>
           <p:nvPr>
             <p:ph idx="1" type="body"/>
@@ -926,7 +1026,7 @@
       </p:grpSpPr>
       <p:sp>
         <p:nvSpPr>
-          <p:cNvPr id="59" name="Google Shape;59;g30521902cbf_0_52:notes"/>
+          <p:cNvPr id="59" name="Google Shape;59;g35c9d3a35b4_0_5:notes"/>
           <p:cNvSpPr/>
           <p:nvPr>
             <p:ph idx="2" type="sldImg"/>
@@ -961,7 +1061,7 @@
       </p:sp>
       <p:sp>
         <p:nvSpPr>
-          <p:cNvPr id="60" name="Google Shape;60;g30521902cbf_0_52:notes"/>
+          <p:cNvPr id="60" name="Google Shape;60;g35c9d3a35b4_0_5:notes"/>
           <p:cNvSpPr txBox="1"/>
           <p:nvPr>
             <p:ph idx="1" type="body"/>
@@ -1011,7 +1111,7 @@
   <p:cSld>
     <p:spTree>
       <p:nvGrpSpPr>
-        <p:cNvPr id="66" name="Shape 66"/>
+        <p:cNvPr id="65" name="Shape 65"/>
         <p:cNvGrpSpPr/>
         <p:nvPr/>
       </p:nvGrpSpPr>
@@ -1025,7 +1125,7 @@
       </p:grpSpPr>
       <p:sp>
         <p:nvSpPr>
-          <p:cNvPr id="67" name="Google Shape;67;g30521902cbf_0_47:notes"/>
+          <p:cNvPr id="66" name="Google Shape;66;g30521902cbf_0_52:notes"/>
           <p:cNvSpPr/>
           <p:nvPr>
             <p:ph idx="2" type="sldImg"/>
@@ -1060,7 +1160,7 @@
       </p:sp>
       <p:sp>
         <p:nvSpPr>
-          <p:cNvPr id="68" name="Google Shape;68;g30521902cbf_0_47:notes"/>
+          <p:cNvPr id="67" name="Google Shape;67;g30521902cbf_0_52:notes"/>
           <p:cNvSpPr txBox="1"/>
           <p:nvPr>
             <p:ph idx="1" type="body"/>
@@ -1124,7 +1224,7 @@
       </p:grpSpPr>
       <p:sp>
         <p:nvSpPr>
-          <p:cNvPr id="74" name="Google Shape;74;g30521902cbf_0_62:notes"/>
+          <p:cNvPr id="74" name="Google Shape;74;g30521902cbf_0_47:notes"/>
           <p:cNvSpPr/>
           <p:nvPr>
             <p:ph idx="2" type="sldImg"/>
@@ -1159,7 +1259,7 @@
       </p:sp>
       <p:sp>
         <p:nvSpPr>
-          <p:cNvPr id="75" name="Google Shape;75;g30521902cbf_0_62:notes"/>
+          <p:cNvPr id="75" name="Google Shape;75;g30521902cbf_0_47:notes"/>
           <p:cNvSpPr txBox="1"/>
           <p:nvPr>
             <p:ph idx="1" type="body"/>
@@ -1209,7 +1309,7 @@
   <p:cSld>
     <p:spTree>
       <p:nvGrpSpPr>
-        <p:cNvPr id="79" name="Shape 79"/>
+        <p:cNvPr id="80" name="Shape 80"/>
         <p:cNvGrpSpPr/>
         <p:nvPr/>
       </p:nvGrpSpPr>
@@ -1223,7 +1323,7 @@
       </p:grpSpPr>
       <p:sp>
         <p:nvSpPr>
-          <p:cNvPr id="80" name="Google Shape;80;g30521902cbf_0_72:notes"/>
+          <p:cNvPr id="81" name="Google Shape;81;g30521902cbf_0_62:notes"/>
           <p:cNvSpPr/>
           <p:nvPr>
             <p:ph idx="2" type="sldImg"/>
@@ -1258,7 +1358,7 @@
       </p:sp>
       <p:sp>
         <p:nvSpPr>
-          <p:cNvPr id="81" name="Google Shape;81;g30521902cbf_0_72:notes"/>
+          <p:cNvPr id="82" name="Google Shape;82;g30521902cbf_0_62:notes"/>
           <p:cNvSpPr txBox="1"/>
           <p:nvPr>
             <p:ph idx="1" type="body"/>
@@ -1308,7 +1408,7 @@
   <p:cSld>
     <p:spTree>
       <p:nvGrpSpPr>
-        <p:cNvPr id="88" name="Shape 88"/>
+        <p:cNvPr id="86" name="Shape 86"/>
         <p:cNvGrpSpPr/>
         <p:nvPr/>
       </p:nvGrpSpPr>
@@ -1322,7 +1422,7 @@
       </p:grpSpPr>
       <p:sp>
         <p:nvSpPr>
-          <p:cNvPr id="89" name="Google Shape;89;g358cb5d9b42_0_3:notes"/>
+          <p:cNvPr id="87" name="Google Shape;87;g30521902cbf_0_72:notes"/>
           <p:cNvSpPr/>
           <p:nvPr>
             <p:ph idx="2" type="sldImg"/>
@@ -1357,7 +1457,7 @@
       </p:sp>
       <p:sp>
         <p:nvSpPr>
-          <p:cNvPr id="90" name="Google Shape;90;g358cb5d9b42_0_3:notes"/>
+          <p:cNvPr id="88" name="Google Shape;88;g30521902cbf_0_72:notes"/>
           <p:cNvSpPr txBox="1"/>
           <p:nvPr>
             <p:ph idx="1" type="body"/>
@@ -1407,7 +1507,7 @@
   <p:cSld>
     <p:spTree>
       <p:nvGrpSpPr>
-        <p:cNvPr id="97" name="Shape 97"/>
+        <p:cNvPr id="95" name="Shape 95"/>
         <p:cNvGrpSpPr/>
         <p:nvPr/>
       </p:nvGrpSpPr>
@@ -1421,7 +1521,7 @@
       </p:grpSpPr>
       <p:sp>
         <p:nvSpPr>
-          <p:cNvPr id="98" name="Google Shape;98;g30521902cbf_0_80:notes"/>
+          <p:cNvPr id="96" name="Google Shape;96;g358cb5d9b42_0_3:notes"/>
           <p:cNvSpPr/>
           <p:nvPr>
             <p:ph idx="2" type="sldImg"/>
@@ -1456,7 +1556,7 @@
       </p:sp>
       <p:sp>
         <p:nvSpPr>
-          <p:cNvPr id="99" name="Google Shape;99;g30521902cbf_0_80:notes"/>
+          <p:cNvPr id="97" name="Google Shape;97;g358cb5d9b42_0_3:notes"/>
           <p:cNvSpPr txBox="1"/>
           <p:nvPr>
             <p:ph idx="1" type="body"/>
@@ -1506,7 +1606,7 @@
   <p:cSld>
     <p:spTree>
       <p:nvGrpSpPr>
-        <p:cNvPr id="106" name="Shape 106"/>
+        <p:cNvPr id="104" name="Shape 104"/>
         <p:cNvGrpSpPr/>
         <p:nvPr/>
       </p:nvGrpSpPr>
@@ -1520,7 +1620,7 @@
       </p:grpSpPr>
       <p:sp>
         <p:nvSpPr>
-          <p:cNvPr id="107" name="Google Shape;107;g30521902cbf_0_85:notes"/>
+          <p:cNvPr id="105" name="Google Shape;105;g30521902cbf_0_80:notes"/>
           <p:cNvSpPr/>
           <p:nvPr>
             <p:ph idx="2" type="sldImg"/>
@@ -1555,7 +1655,7 @@
       </p:sp>
       <p:sp>
         <p:nvSpPr>
-          <p:cNvPr id="108" name="Google Shape;108;g30521902cbf_0_85:notes"/>
+          <p:cNvPr id="106" name="Google Shape;106;g30521902cbf_0_80:notes"/>
           <p:cNvSpPr txBox="1"/>
           <p:nvPr>
             <p:ph idx="1" type="body"/>
@@ -1619,7 +1719,7 @@
       </p:grpSpPr>
       <p:sp>
         <p:nvSpPr>
-          <p:cNvPr id="114" name="Google Shape;114;g30521902cbf_0_117:notes"/>
+          <p:cNvPr id="114" name="Google Shape;114;g30521902cbf_0_85:notes"/>
           <p:cNvSpPr/>
           <p:nvPr>
             <p:ph idx="2" type="sldImg"/>
@@ -1654,7 +1754,7 @@
       </p:sp>
       <p:sp>
         <p:nvSpPr>
-          <p:cNvPr id="115" name="Google Shape;115;g30521902cbf_0_117:notes"/>
+          <p:cNvPr id="115" name="Google Shape;115;g30521902cbf_0_85:notes"/>
           <p:cNvSpPr txBox="1"/>
           <p:nvPr>
             <p:ph idx="1" type="body"/>
@@ -7157,7 +7257,7 @@
   <p:cSld>
     <p:spTree>
       <p:nvGrpSpPr>
-        <p:cNvPr id="122" name="Shape 122"/>
+        <p:cNvPr id="123" name="Shape 123"/>
         <p:cNvGrpSpPr/>
         <p:nvPr/>
       </p:nvGrpSpPr>
@@ -7171,7 +7271,7 @@
       </p:grpSpPr>
       <p:sp>
         <p:nvSpPr>
-          <p:cNvPr id="123" name="Google Shape;123;p22"/>
+          <p:cNvPr id="124" name="Google Shape;124;p22"/>
           <p:cNvSpPr txBox="1"/>
           <p:nvPr>
             <p:ph type="title"/>
@@ -7203,6 +7303,181 @@
             </a:pPr>
             <a:r>
               <a:rPr lang="ru"/>
+              <a:t>Асимптотика</a:t>
+            </a:r>
+            <a:endParaRPr/>
+          </a:p>
+        </p:txBody>
+      </p:sp>
+      <p:sp>
+        <p:nvSpPr>
+          <p:cNvPr id="125" name="Google Shape;125;p22"/>
+          <p:cNvSpPr txBox="1"/>
+          <p:nvPr>
+            <p:ph idx="1" type="body"/>
+          </p:nvPr>
+        </p:nvSpPr>
+        <p:spPr>
+          <a:xfrm>
+            <a:off x="311700" y="1228675"/>
+            <a:ext cx="8520600" cy="3340200"/>
+          </a:xfrm>
+          <a:prstGeom prst="rect">
+            <a:avLst/>
+          </a:prstGeom>
+        </p:spPr>
+        <p:txBody>
+          <a:bodyPr anchorCtr="0" anchor="t" bIns="91425" lIns="91425" spcFirstLastPara="1" rIns="91425" wrap="square" tIns="91425">
+            <a:normAutofit/>
+          </a:bodyPr>
+          <a:lstStyle/>
+          <a:p>
+            <a:pPr indent="0" lvl="0" marL="0" rtl="0" algn="l">
+              <a:spcBef>
+                <a:spcPts val="0"/>
+              </a:spcBef>
+              <a:spcAft>
+                <a:spcPts val="0"/>
+              </a:spcAft>
+              <a:buNone/>
+            </a:pPr>
+            <a:r>
+              <a:rPr lang="ru"/>
+              <a:t>Время работы алгоритма составляет O</a:t>
+            </a:r>
+            <a:r>
+              <a:rPr lang="ru"/>
+              <a:t>(EV) и по памяти O(EV)</a:t>
+            </a:r>
+            <a:endParaRPr/>
+          </a:p>
+          <a:p>
+            <a:pPr indent="0" lvl="0" marL="0" rtl="0" algn="l">
+              <a:spcBef>
+                <a:spcPts val="1200"/>
+              </a:spcBef>
+              <a:spcAft>
+                <a:spcPts val="0"/>
+              </a:spcAft>
+              <a:buNone/>
+            </a:pPr>
+            <a:r>
+              <a:rPr lang="ru"/>
+              <a:t>Можно ли быстрее?</a:t>
+            </a:r>
+            <a:endParaRPr/>
+          </a:p>
+          <a:p>
+            <a:pPr indent="0" lvl="0" marL="0" rtl="0" algn="l">
+              <a:spcBef>
+                <a:spcPts val="1200"/>
+              </a:spcBef>
+              <a:spcAft>
+                <a:spcPts val="0"/>
+              </a:spcAft>
+              <a:buNone/>
+            </a:pPr>
+            <a:r>
+              <a:rPr lang="ru"/>
+              <a:t>Да, можно, существуют:</a:t>
+            </a:r>
+            <a:endParaRPr/>
+          </a:p>
+          <a:p>
+            <a:pPr indent="-342900" lvl="0" marL="457200" rtl="0" algn="l">
+              <a:spcBef>
+                <a:spcPts val="1200"/>
+              </a:spcBef>
+              <a:spcAft>
+                <a:spcPts val="0"/>
+              </a:spcAft>
+              <a:buSzPts val="1800"/>
+              <a:buChar char="-"/>
+            </a:pPr>
+            <a:r>
+              <a:rPr lang="ru"/>
+              <a:t>Реализация Тарьяна O(min(ElogV, V^2))</a:t>
+            </a:r>
+            <a:endParaRPr/>
+          </a:p>
+          <a:p>
+            <a:pPr indent="-342900" lvl="0" marL="457200" rtl="0" algn="l">
+              <a:spcBef>
+                <a:spcPts val="0"/>
+              </a:spcBef>
+              <a:spcAft>
+                <a:spcPts val="0"/>
+              </a:spcAft>
+              <a:buSzPts val="1800"/>
+              <a:buChar char="-"/>
+            </a:pPr>
+            <a:r>
+              <a:rPr lang="ru"/>
+              <a:t>В 1986 Габов, Галиль, Спенсер, Комптон и Тарьян предложили более быструю реализацию со временем работы O(E + V logV)</a:t>
+            </a:r>
+            <a:endParaRPr/>
+          </a:p>
+        </p:txBody>
+      </p:sp>
+    </p:spTree>
+  </p:cSld>
+  <p:clrMapOvr>
+    <a:masterClrMapping/>
+  </p:clrMapOvr>
+</p:sld>
+</file>
+
+<file path=ppt/slides/slide11.xml><?xml version="1.0" encoding="utf-8"?>
+<p:sld xmlns:a="http://schemas.openxmlformats.org/drawingml/2006/main" xmlns:r="http://schemas.openxmlformats.org/officeDocument/2006/relationships" xmlns:mc="http://schemas.openxmlformats.org/markup-compatibility/2006" xmlns:mv="urn:schemas-microsoft-com:mac:vml" xmlns:p="http://schemas.openxmlformats.org/presentationml/2006/main" xmlns:c="http://schemas.openxmlformats.org/drawingml/2006/chart" xmlns:dgm="http://schemas.openxmlformats.org/drawingml/2006/diagram" xmlns:o="urn:schemas-microsoft-com:office:office" xmlns:v="urn:schemas-microsoft-com:vml" xmlns:pvml="urn:schemas-microsoft-com:office:powerpoint" xmlns:com="http://schemas.openxmlformats.org/drawingml/2006/compatibility" xmlns:p14="http://schemas.microsoft.com/office/powerpoint/2010/main" xmlns:p15="http://schemas.microsoft.com/office/powerpoint/2012/main" xmlns:ahyp="http://schemas.microsoft.com/office/drawing/2018/hyperlinkcolor">
+  <p:cSld>
+    <p:spTree>
+      <p:nvGrpSpPr>
+        <p:cNvPr id="129" name="Shape 129"/>
+        <p:cNvGrpSpPr/>
+        <p:nvPr/>
+      </p:nvGrpSpPr>
+      <p:grpSpPr>
+        <a:xfrm>
+          <a:off x="0" y="0"/>
+          <a:ext cx="0" cy="0"/>
+          <a:chOff x="0" y="0"/>
+          <a:chExt cx="0" cy="0"/>
+        </a:xfrm>
+      </p:grpSpPr>
+      <p:sp>
+        <p:nvSpPr>
+          <p:cNvPr id="130" name="Google Shape;130;p23"/>
+          <p:cNvSpPr txBox="1"/>
+          <p:nvPr>
+            <p:ph type="title"/>
+          </p:nvPr>
+        </p:nvSpPr>
+        <p:spPr>
+          <a:xfrm>
+            <a:off x="311700" y="292850"/>
+            <a:ext cx="8520600" cy="801000"/>
+          </a:xfrm>
+          <a:prstGeom prst="rect">
+            <a:avLst/>
+          </a:prstGeom>
+        </p:spPr>
+        <p:txBody>
+          <a:bodyPr anchorCtr="0" anchor="t" bIns="91425" lIns="91425" spcFirstLastPara="1" rIns="91425" wrap="square" tIns="91425">
+            <a:normAutofit fontScale="90000"/>
+          </a:bodyPr>
+          <a:lstStyle/>
+          <a:p>
+            <a:pPr indent="0" lvl="0" marL="0" rtl="0" algn="l">
+              <a:spcBef>
+                <a:spcPts val="0"/>
+              </a:spcBef>
+              <a:spcAft>
+                <a:spcPts val="0"/>
+              </a:spcAft>
+              <a:buNone/>
+            </a:pPr>
+            <a:r>
+              <a:rPr lang="ru"/>
               <a:t>Области применения</a:t>
             </a:r>
             <a:endParaRPr/>
@@ -7211,7 +7486,7 @@
       </p:sp>
       <p:sp>
         <p:nvSpPr>
-          <p:cNvPr id="124" name="Google Shape;124;p22"/>
+          <p:cNvPr id="131" name="Google Shape;131;p23"/>
           <p:cNvSpPr txBox="1"/>
           <p:nvPr>
             <p:ph idx="1" type="body"/>
@@ -7359,6 +7634,391 @@
             </a:pPr>
             <a:r>
               <a:rPr lang="ru"/>
+              <a:t>Роли</a:t>
+            </a:r>
+            <a:endParaRPr/>
+          </a:p>
+        </p:txBody>
+      </p:sp>
+      <p:sp>
+        <p:nvSpPr>
+          <p:cNvPr id="63" name="Google Shape;63;p14"/>
+          <p:cNvSpPr txBox="1"/>
+          <p:nvPr>
+            <p:ph idx="1" type="body"/>
+          </p:nvPr>
+        </p:nvSpPr>
+        <p:spPr>
+          <a:xfrm>
+            <a:off x="311700" y="1093850"/>
+            <a:ext cx="4260300" cy="3042600"/>
+          </a:xfrm>
+          <a:prstGeom prst="rect">
+            <a:avLst/>
+          </a:prstGeom>
+        </p:spPr>
+        <p:txBody>
+          <a:bodyPr anchorCtr="0" anchor="t" bIns="91425" lIns="91425" spcFirstLastPara="1" rIns="91425" wrap="square" tIns="91425">
+            <a:normAutofit/>
+          </a:bodyPr>
+          <a:lstStyle/>
+          <a:p>
+            <a:pPr indent="0" lvl="0" marL="0" rtl="0" algn="l">
+              <a:spcBef>
+                <a:spcPts val="0"/>
+              </a:spcBef>
+              <a:spcAft>
+                <a:spcPts val="0"/>
+              </a:spcAft>
+              <a:buNone/>
+            </a:pPr>
+            <a:r>
+              <a:rPr b="1" lang="ru">
+                <a:solidFill>
+                  <a:srgbClr val="434343"/>
+                </a:solidFill>
+              </a:rPr>
+              <a:t>Ижболдин А.В.</a:t>
+            </a:r>
+            <a:endParaRPr b="1">
+              <a:solidFill>
+                <a:srgbClr val="434343"/>
+              </a:solidFill>
+            </a:endParaRPr>
+          </a:p>
+          <a:p>
+            <a:pPr indent="-342900" lvl="0" marL="457200" rtl="0" algn="l">
+              <a:spcBef>
+                <a:spcPts val="1200"/>
+              </a:spcBef>
+              <a:spcAft>
+                <a:spcPts val="0"/>
+              </a:spcAft>
+              <a:buClr>
+                <a:srgbClr val="434343"/>
+              </a:buClr>
+              <a:buSzPts val="1800"/>
+              <a:buChar char="-"/>
+            </a:pPr>
+            <a:r>
+              <a:rPr lang="ru">
+                <a:solidFill>
+                  <a:srgbClr val="434343"/>
+                </a:solidFill>
+              </a:rPr>
+              <a:t>Описание алгоритма, его доказательство.</a:t>
+            </a:r>
+            <a:endParaRPr>
+              <a:solidFill>
+                <a:srgbClr val="434343"/>
+              </a:solidFill>
+            </a:endParaRPr>
+          </a:p>
+          <a:p>
+            <a:pPr indent="-342900" lvl="0" marL="457200" rtl="0" algn="l">
+              <a:spcBef>
+                <a:spcPts val="0"/>
+              </a:spcBef>
+              <a:spcAft>
+                <a:spcPts val="0"/>
+              </a:spcAft>
+              <a:buClr>
+                <a:srgbClr val="434343"/>
+              </a:buClr>
+              <a:buSzPts val="1800"/>
+              <a:buChar char="-"/>
+            </a:pPr>
+            <a:r>
+              <a:rPr lang="ru">
+                <a:solidFill>
+                  <a:srgbClr val="434343"/>
+                </a:solidFill>
+              </a:rPr>
+              <a:t>Области применения, вариации алгоритма</a:t>
+            </a:r>
+            <a:endParaRPr>
+              <a:solidFill>
+                <a:srgbClr val="434343"/>
+              </a:solidFill>
+            </a:endParaRPr>
+          </a:p>
+          <a:p>
+            <a:pPr indent="-342900" lvl="0" marL="457200" rtl="0" algn="l">
+              <a:spcBef>
+                <a:spcPts val="0"/>
+              </a:spcBef>
+              <a:spcAft>
+                <a:spcPts val="0"/>
+              </a:spcAft>
+              <a:buClr>
+                <a:srgbClr val="434343"/>
+              </a:buClr>
+              <a:buSzPts val="1800"/>
+              <a:buChar char="-"/>
+            </a:pPr>
+            <a:r>
+              <a:rPr lang="ru">
+                <a:solidFill>
+                  <a:srgbClr val="434343"/>
+                </a:solidFill>
+              </a:rPr>
+              <a:t>Тестирование кода</a:t>
+            </a:r>
+            <a:endParaRPr>
+              <a:solidFill>
+                <a:srgbClr val="434343"/>
+              </a:solidFill>
+            </a:endParaRPr>
+          </a:p>
+          <a:p>
+            <a:pPr indent="-342900" lvl="0" marL="457200" rtl="0" algn="l">
+              <a:spcBef>
+                <a:spcPts val="0"/>
+              </a:spcBef>
+              <a:spcAft>
+                <a:spcPts val="0"/>
+              </a:spcAft>
+              <a:buClr>
+                <a:srgbClr val="434343"/>
+              </a:buClr>
+              <a:buSzPts val="1800"/>
+              <a:buChar char="-"/>
+            </a:pPr>
+            <a:r>
+              <a:rPr lang="ru">
+                <a:solidFill>
+                  <a:srgbClr val="434343"/>
+                </a:solidFill>
+              </a:rPr>
+              <a:t>Создание презентации</a:t>
+            </a:r>
+            <a:endParaRPr>
+              <a:solidFill>
+                <a:srgbClr val="434343"/>
+              </a:solidFill>
+            </a:endParaRPr>
+          </a:p>
+        </p:txBody>
+      </p:sp>
+      <p:sp>
+        <p:nvSpPr>
+          <p:cNvPr id="64" name="Google Shape;64;p14"/>
+          <p:cNvSpPr txBox="1"/>
+          <p:nvPr>
+            <p:ph idx="1" type="body"/>
+          </p:nvPr>
+        </p:nvSpPr>
+        <p:spPr>
+          <a:xfrm>
+            <a:off x="4572000" y="1093850"/>
+            <a:ext cx="4260300" cy="3042600"/>
+          </a:xfrm>
+          <a:prstGeom prst="rect">
+            <a:avLst/>
+          </a:prstGeom>
+        </p:spPr>
+        <p:txBody>
+          <a:bodyPr anchorCtr="0" anchor="t" bIns="91425" lIns="91425" spcFirstLastPara="1" rIns="91425" wrap="square" tIns="91425">
+            <a:normAutofit/>
+          </a:bodyPr>
+          <a:lstStyle/>
+          <a:p>
+            <a:pPr indent="0" lvl="0" marL="0" rtl="0" algn="l">
+              <a:spcBef>
+                <a:spcPts val="0"/>
+              </a:spcBef>
+              <a:spcAft>
+                <a:spcPts val="0"/>
+              </a:spcAft>
+              <a:buNone/>
+            </a:pPr>
+            <a:r>
+              <a:rPr b="1" lang="ru">
+                <a:solidFill>
+                  <a:srgbClr val="434343"/>
+                </a:solidFill>
+              </a:rPr>
+              <a:t>Снигирёв А.А.</a:t>
+            </a:r>
+            <a:endParaRPr b="1">
+              <a:solidFill>
+                <a:srgbClr val="434343"/>
+              </a:solidFill>
+            </a:endParaRPr>
+          </a:p>
+          <a:p>
+            <a:pPr indent="-342900" lvl="0" marL="457200" rtl="0" algn="l">
+              <a:spcBef>
+                <a:spcPts val="1200"/>
+              </a:spcBef>
+              <a:spcAft>
+                <a:spcPts val="0"/>
+              </a:spcAft>
+              <a:buClr>
+                <a:srgbClr val="434343"/>
+              </a:buClr>
+              <a:buSzPts val="1800"/>
+              <a:buChar char="-"/>
+            </a:pPr>
+            <a:r>
+              <a:rPr lang="ru">
+                <a:solidFill>
+                  <a:srgbClr val="434343"/>
+                </a:solidFill>
+              </a:rPr>
+              <a:t>Разработка алгоритма</a:t>
+            </a:r>
+            <a:endParaRPr>
+              <a:solidFill>
+                <a:srgbClr val="434343"/>
+              </a:solidFill>
+            </a:endParaRPr>
+          </a:p>
+          <a:p>
+            <a:pPr indent="-342900" lvl="0" marL="457200" rtl="0" algn="l">
+              <a:spcBef>
+                <a:spcPts val="0"/>
+              </a:spcBef>
+              <a:spcAft>
+                <a:spcPts val="0"/>
+              </a:spcAft>
+              <a:buClr>
+                <a:srgbClr val="434343"/>
+              </a:buClr>
+              <a:buSzPts val="1800"/>
+              <a:buChar char="-"/>
+            </a:pPr>
+            <a:r>
+              <a:rPr lang="ru">
+                <a:solidFill>
+                  <a:srgbClr val="434343"/>
+                </a:solidFill>
+              </a:rPr>
+              <a:t>Тестирование кода</a:t>
+            </a:r>
+            <a:endParaRPr>
+              <a:solidFill>
+                <a:srgbClr val="434343"/>
+              </a:solidFill>
+            </a:endParaRPr>
+          </a:p>
+          <a:p>
+            <a:pPr indent="-342900" lvl="0" marL="457200" rtl="0" algn="l">
+              <a:spcBef>
+                <a:spcPts val="0"/>
+              </a:spcBef>
+              <a:spcAft>
+                <a:spcPts val="0"/>
+              </a:spcAft>
+              <a:buClr>
+                <a:srgbClr val="434343"/>
+              </a:buClr>
+              <a:buSzPts val="1800"/>
+              <a:buChar char="-"/>
+            </a:pPr>
+            <a:r>
+              <a:rPr lang="ru">
+                <a:solidFill>
+                  <a:srgbClr val="434343"/>
+                </a:solidFill>
+              </a:rPr>
+              <a:t>Написание визуализации для алгоритма</a:t>
+            </a:r>
+            <a:endParaRPr>
+              <a:solidFill>
+                <a:srgbClr val="434343"/>
+              </a:solidFill>
+            </a:endParaRPr>
+          </a:p>
+          <a:p>
+            <a:pPr indent="-342900" lvl="0" marL="457200" rtl="0" algn="l">
+              <a:spcBef>
+                <a:spcPts val="0"/>
+              </a:spcBef>
+              <a:spcAft>
+                <a:spcPts val="0"/>
+              </a:spcAft>
+              <a:buClr>
+                <a:srgbClr val="434343"/>
+              </a:buClr>
+              <a:buSzPts val="1800"/>
+              <a:buChar char="-"/>
+            </a:pPr>
+            <a:r>
+              <a:rPr lang="ru">
+                <a:solidFill>
+                  <a:srgbClr val="434343"/>
+                </a:solidFill>
+              </a:rPr>
+              <a:t>Рецензия теоретического материала</a:t>
+            </a:r>
+            <a:endParaRPr>
+              <a:solidFill>
+                <a:srgbClr val="434343"/>
+              </a:solidFill>
+            </a:endParaRPr>
+          </a:p>
+        </p:txBody>
+      </p:sp>
+    </p:spTree>
+  </p:cSld>
+  <p:clrMapOvr>
+    <a:masterClrMapping/>
+  </p:clrMapOvr>
+</p:sld>
+</file>
+
+<file path=ppt/slides/slide3.xml><?xml version="1.0" encoding="utf-8"?>
+<p:sld xmlns:a="http://schemas.openxmlformats.org/drawingml/2006/main" xmlns:r="http://schemas.openxmlformats.org/officeDocument/2006/relationships" xmlns:mc="http://schemas.openxmlformats.org/markup-compatibility/2006" xmlns:mv="urn:schemas-microsoft-com:mac:vml" xmlns:p="http://schemas.openxmlformats.org/presentationml/2006/main" xmlns:c="http://schemas.openxmlformats.org/drawingml/2006/chart" xmlns:dgm="http://schemas.openxmlformats.org/drawingml/2006/diagram" xmlns:o="urn:schemas-microsoft-com:office:office" xmlns:v="urn:schemas-microsoft-com:vml" xmlns:pvml="urn:schemas-microsoft-com:office:powerpoint" xmlns:com="http://schemas.openxmlformats.org/drawingml/2006/compatibility" xmlns:p14="http://schemas.microsoft.com/office/powerpoint/2010/main" xmlns:p15="http://schemas.microsoft.com/office/powerpoint/2012/main" xmlns:ahyp="http://schemas.microsoft.com/office/drawing/2018/hyperlinkcolor">
+  <p:cSld>
+    <p:spTree>
+      <p:nvGrpSpPr>
+        <p:cNvPr id="68" name="Shape 68"/>
+        <p:cNvGrpSpPr/>
+        <p:nvPr/>
+      </p:nvGrpSpPr>
+      <p:grpSpPr>
+        <a:xfrm>
+          <a:off x="0" y="0"/>
+          <a:ext cx="0" cy="0"/>
+          <a:chOff x="0" y="0"/>
+          <a:chExt cx="0" cy="0"/>
+        </a:xfrm>
+      </p:grpSpPr>
+      <p:sp>
+        <p:nvSpPr>
+          <p:cNvPr id="69" name="Google Shape;69;p15"/>
+          <p:cNvSpPr txBox="1"/>
+          <p:nvPr>
+            <p:ph type="title"/>
+          </p:nvPr>
+        </p:nvSpPr>
+        <p:spPr>
+          <a:xfrm>
+            <a:off x="311700" y="292850"/>
+            <a:ext cx="8520600" cy="801000"/>
+          </a:xfrm>
+          <a:prstGeom prst="rect">
+            <a:avLst/>
+          </a:prstGeom>
+        </p:spPr>
+        <p:txBody>
+          <a:bodyPr anchorCtr="0" anchor="t" bIns="91425" lIns="91425" spcFirstLastPara="1" rIns="91425" wrap="square" tIns="91425">
+            <a:normAutofit fontScale="90000"/>
+          </a:bodyPr>
+          <a:lstStyle/>
+          <a:p>
+            <a:pPr indent="0" lvl="0" marL="0" rtl="0" algn="l">
+              <a:spcBef>
+                <a:spcPts val="0"/>
+              </a:spcBef>
+              <a:spcAft>
+                <a:spcPts val="0"/>
+              </a:spcAft>
+              <a:buNone/>
+            </a:pPr>
+            <a:r>
+              <a:rPr lang="ru"/>
               <a:t>Алгоритм чу-лью/эдмондса</a:t>
             </a:r>
             <a:endParaRPr/>
@@ -7397,7 +8057,7 @@
       </p:sp>
       <p:sp>
         <p:nvSpPr>
-          <p:cNvPr id="63" name="Google Shape;63;p14"/>
+          <p:cNvPr id="70" name="Google Shape;70;p15"/>
           <p:cNvSpPr txBox="1"/>
           <p:nvPr>
             <p:ph idx="1" type="body"/>
@@ -7477,7 +8137,7 @@
       </p:sp>
       <p:pic>
         <p:nvPicPr>
-          <p:cNvPr id="64" name="Google Shape;64;p14"/>
+          <p:cNvPr id="71" name="Google Shape;71;p15"/>
           <p:cNvPicPr preferRelativeResize="0"/>
           <p:nvPr/>
         </p:nvPicPr>
@@ -7505,7 +8165,7 @@
       </p:pic>
       <p:sp>
         <p:nvSpPr>
-          <p:cNvPr id="65" name="Google Shape;65;p14"/>
+          <p:cNvPr id="72" name="Google Shape;72;p15"/>
           <p:cNvSpPr txBox="1"/>
           <p:nvPr/>
         </p:nvSpPr>
@@ -7561,227 +8221,6 @@
           </a:p>
         </p:txBody>
       </p:sp>
-    </p:spTree>
-  </p:cSld>
-  <p:clrMapOvr>
-    <a:masterClrMapping/>
-  </p:clrMapOvr>
-</p:sld>
-</file>
-
-<file path=ppt/slides/slide3.xml><?xml version="1.0" encoding="utf-8"?>
-<p:sld xmlns:a="http://schemas.openxmlformats.org/drawingml/2006/main" xmlns:r="http://schemas.openxmlformats.org/officeDocument/2006/relationships" xmlns:mc="http://schemas.openxmlformats.org/markup-compatibility/2006" xmlns:mv="urn:schemas-microsoft-com:mac:vml" xmlns:p="http://schemas.openxmlformats.org/presentationml/2006/main" xmlns:c="http://schemas.openxmlformats.org/drawingml/2006/chart" xmlns:dgm="http://schemas.openxmlformats.org/drawingml/2006/diagram" xmlns:o="urn:schemas-microsoft-com:office:office" xmlns:v="urn:schemas-microsoft-com:vml" xmlns:pvml="urn:schemas-microsoft-com:office:powerpoint" xmlns:com="http://schemas.openxmlformats.org/drawingml/2006/compatibility" xmlns:p14="http://schemas.microsoft.com/office/powerpoint/2010/main" xmlns:p15="http://schemas.microsoft.com/office/powerpoint/2012/main" xmlns:ahyp="http://schemas.microsoft.com/office/drawing/2018/hyperlinkcolor">
-  <p:cSld>
-    <p:spTree>
-      <p:nvGrpSpPr>
-        <p:cNvPr id="69" name="Shape 69"/>
-        <p:cNvGrpSpPr/>
-        <p:nvPr/>
-      </p:nvGrpSpPr>
-      <p:grpSpPr>
-        <a:xfrm>
-          <a:off x="0" y="0"/>
-          <a:ext cx="0" cy="0"/>
-          <a:chOff x="0" y="0"/>
-          <a:chExt cx="0" cy="0"/>
-        </a:xfrm>
-      </p:grpSpPr>
-      <p:sp>
-        <p:nvSpPr>
-          <p:cNvPr id="70" name="Google Shape;70;p15"/>
-          <p:cNvSpPr txBox="1"/>
-          <p:nvPr>
-            <p:ph type="title"/>
-          </p:nvPr>
-        </p:nvSpPr>
-        <p:spPr>
-          <a:xfrm>
-            <a:off x="311700" y="292850"/>
-            <a:ext cx="8520600" cy="801000"/>
-          </a:xfrm>
-          <a:prstGeom prst="rect">
-            <a:avLst/>
-          </a:prstGeom>
-        </p:spPr>
-        <p:txBody>
-          <a:bodyPr anchorCtr="0" anchor="t" bIns="91425" lIns="91425" spcFirstLastPara="1" rIns="91425" wrap="square" tIns="91425">
-            <a:normAutofit fontScale="90000"/>
-          </a:bodyPr>
-          <a:lstStyle/>
-          <a:p>
-            <a:pPr indent="0" lvl="0" marL="0" rtl="0" algn="l">
-              <a:spcBef>
-                <a:spcPts val="0"/>
-              </a:spcBef>
-              <a:spcAft>
-                <a:spcPts val="0"/>
-              </a:spcAft>
-              <a:buNone/>
-            </a:pPr>
-            <a:r>
-              <a:rPr lang="ru"/>
-              <a:t>Зачем?</a:t>
-            </a:r>
-            <a:endParaRPr/>
-          </a:p>
-        </p:txBody>
-      </p:sp>
-      <p:sp>
-        <p:nvSpPr>
-          <p:cNvPr id="71" name="Google Shape;71;p15"/>
-          <p:cNvSpPr txBox="1"/>
-          <p:nvPr>
-            <p:ph idx="1" type="body"/>
-          </p:nvPr>
-        </p:nvSpPr>
-        <p:spPr>
-          <a:xfrm>
-            <a:off x="311700" y="1228675"/>
-            <a:ext cx="6157500" cy="3042600"/>
-          </a:xfrm>
-          <a:prstGeom prst="rect">
-            <a:avLst/>
-          </a:prstGeom>
-        </p:spPr>
-        <p:txBody>
-          <a:bodyPr anchorCtr="0" anchor="t" bIns="91425" lIns="91425" spcFirstLastPara="1" rIns="91425" wrap="square" tIns="91425">
-            <a:normAutofit lnSpcReduction="20000"/>
-          </a:bodyPr>
-          <a:lstStyle/>
-          <a:p>
-            <a:pPr indent="0" lvl="0" marL="0" rtl="0" algn="l">
-              <a:spcBef>
-                <a:spcPts val="0"/>
-              </a:spcBef>
-              <a:spcAft>
-                <a:spcPts val="0"/>
-              </a:spcAft>
-              <a:buNone/>
-            </a:pPr>
-            <a:r>
-              <a:rPr lang="ru">
-                <a:solidFill>
-                  <a:srgbClr val="434343"/>
-                </a:solidFill>
-              </a:rPr>
-              <a:t>Ранее известные алгоритма (Прима или Краскала) работают только для неориентированных графов, но что если мы хотим решить задачу в ориентированных графах?</a:t>
-            </a:r>
-            <a:endParaRPr>
-              <a:solidFill>
-                <a:srgbClr val="434343"/>
-              </a:solidFill>
-            </a:endParaRPr>
-          </a:p>
-          <a:p>
-            <a:pPr indent="0" lvl="0" marL="0" rtl="0" algn="l">
-              <a:spcBef>
-                <a:spcPts val="1200"/>
-              </a:spcBef>
-              <a:spcAft>
-                <a:spcPts val="0"/>
-              </a:spcAft>
-              <a:buNone/>
-            </a:pPr>
-            <a:r>
-              <a:rPr lang="ru">
-                <a:solidFill>
-                  <a:srgbClr val="434343"/>
-                </a:solidFill>
-              </a:rPr>
-              <a:t>Возникают следующие проблемы:</a:t>
-            </a:r>
-            <a:endParaRPr>
-              <a:solidFill>
-                <a:srgbClr val="434343"/>
-              </a:solidFill>
-            </a:endParaRPr>
-          </a:p>
-          <a:p>
-            <a:pPr indent="-342900" lvl="0" marL="457200" rtl="0" algn="l">
-              <a:spcBef>
-                <a:spcPts val="1200"/>
-              </a:spcBef>
-              <a:spcAft>
-                <a:spcPts val="0"/>
-              </a:spcAft>
-              <a:buClr>
-                <a:srgbClr val="434343"/>
-              </a:buClr>
-              <a:buSzPts val="1800"/>
-              <a:buChar char="-"/>
-            </a:pPr>
-            <a:r>
-              <a:rPr lang="ru">
-                <a:solidFill>
-                  <a:srgbClr val="434343"/>
-                </a:solidFill>
-              </a:rPr>
-              <a:t>Нельзя просто брать минимальные ребра (нужно учитывать направление)</a:t>
-            </a:r>
-            <a:endParaRPr>
-              <a:solidFill>
-                <a:srgbClr val="434343"/>
-              </a:solidFill>
-            </a:endParaRPr>
-          </a:p>
-          <a:p>
-            <a:pPr indent="-342900" lvl="0" marL="457200" rtl="0" algn="l">
-              <a:spcBef>
-                <a:spcPts val="0"/>
-              </a:spcBef>
-              <a:spcAft>
-                <a:spcPts val="0"/>
-              </a:spcAft>
-              <a:buClr>
-                <a:srgbClr val="434343"/>
-              </a:buClr>
-              <a:buSzPts val="1800"/>
-              <a:buChar char="-"/>
-            </a:pPr>
-            <a:r>
-              <a:rPr lang="ru">
-                <a:solidFill>
-                  <a:srgbClr val="434343"/>
-                </a:solidFill>
-              </a:rPr>
-              <a:t>MST может не содержать минимальных ребер</a:t>
-            </a:r>
-            <a:endParaRPr>
-              <a:solidFill>
-                <a:srgbClr val="434343"/>
-              </a:solidFill>
-            </a:endParaRPr>
-          </a:p>
-        </p:txBody>
-      </p:sp>
-      <p:pic>
-        <p:nvPicPr>
-          <p:cNvPr id="72" name="Google Shape;72;p15"/>
-          <p:cNvPicPr preferRelativeResize="0"/>
-          <p:nvPr/>
-        </p:nvPicPr>
-        <p:blipFill>
-          <a:blip r:embed="rId3">
-            <a:alphaModFix/>
-          </a:blip>
-          <a:stretch>
-            <a:fillRect/>
-          </a:stretch>
-        </p:blipFill>
-        <p:spPr>
-          <a:xfrm>
-            <a:off x="5838500" y="1228663"/>
-            <a:ext cx="3867150" cy="790575"/>
-          </a:xfrm>
-          <a:prstGeom prst="rect">
-            <a:avLst/>
-          </a:prstGeom>
-          <a:noFill/>
-          <a:ln>
-            <a:noFill/>
-          </a:ln>
-        </p:spPr>
-      </p:pic>
     </p:spTree>
   </p:cSld>
   <p:clrMapOvr>
@@ -7841,6 +8280,227 @@
             </a:pPr>
             <a:r>
               <a:rPr lang="ru"/>
+              <a:t>Зачем?</a:t>
+            </a:r>
+            <a:endParaRPr/>
+          </a:p>
+        </p:txBody>
+      </p:sp>
+      <p:sp>
+        <p:nvSpPr>
+          <p:cNvPr id="78" name="Google Shape;78;p16"/>
+          <p:cNvSpPr txBox="1"/>
+          <p:nvPr>
+            <p:ph idx="1" type="body"/>
+          </p:nvPr>
+        </p:nvSpPr>
+        <p:spPr>
+          <a:xfrm>
+            <a:off x="311700" y="1228675"/>
+            <a:ext cx="6157500" cy="3042600"/>
+          </a:xfrm>
+          <a:prstGeom prst="rect">
+            <a:avLst/>
+          </a:prstGeom>
+        </p:spPr>
+        <p:txBody>
+          <a:bodyPr anchorCtr="0" anchor="t" bIns="91425" lIns="91425" spcFirstLastPara="1" rIns="91425" wrap="square" tIns="91425">
+            <a:normAutofit lnSpcReduction="20000"/>
+          </a:bodyPr>
+          <a:lstStyle/>
+          <a:p>
+            <a:pPr indent="0" lvl="0" marL="0" rtl="0" algn="l">
+              <a:spcBef>
+                <a:spcPts val="0"/>
+              </a:spcBef>
+              <a:spcAft>
+                <a:spcPts val="0"/>
+              </a:spcAft>
+              <a:buNone/>
+            </a:pPr>
+            <a:r>
+              <a:rPr lang="ru">
+                <a:solidFill>
+                  <a:srgbClr val="434343"/>
+                </a:solidFill>
+              </a:rPr>
+              <a:t>Ранее известные алгоритма (Прима или Краскала) работают только для неориентированных графов, но что если мы хотим решить задачу в ориентированных графах?</a:t>
+            </a:r>
+            <a:endParaRPr>
+              <a:solidFill>
+                <a:srgbClr val="434343"/>
+              </a:solidFill>
+            </a:endParaRPr>
+          </a:p>
+          <a:p>
+            <a:pPr indent="0" lvl="0" marL="0" rtl="0" algn="l">
+              <a:spcBef>
+                <a:spcPts val="1200"/>
+              </a:spcBef>
+              <a:spcAft>
+                <a:spcPts val="0"/>
+              </a:spcAft>
+              <a:buNone/>
+            </a:pPr>
+            <a:r>
+              <a:rPr lang="ru">
+                <a:solidFill>
+                  <a:srgbClr val="434343"/>
+                </a:solidFill>
+              </a:rPr>
+              <a:t>Возникают следующие проблемы:</a:t>
+            </a:r>
+            <a:endParaRPr>
+              <a:solidFill>
+                <a:srgbClr val="434343"/>
+              </a:solidFill>
+            </a:endParaRPr>
+          </a:p>
+          <a:p>
+            <a:pPr indent="-342900" lvl="0" marL="457200" rtl="0" algn="l">
+              <a:spcBef>
+                <a:spcPts val="1200"/>
+              </a:spcBef>
+              <a:spcAft>
+                <a:spcPts val="0"/>
+              </a:spcAft>
+              <a:buClr>
+                <a:srgbClr val="434343"/>
+              </a:buClr>
+              <a:buSzPts val="1800"/>
+              <a:buChar char="-"/>
+            </a:pPr>
+            <a:r>
+              <a:rPr lang="ru">
+                <a:solidFill>
+                  <a:srgbClr val="434343"/>
+                </a:solidFill>
+              </a:rPr>
+              <a:t>Нельзя просто брать минимальные ребра (нужно учитывать направление)</a:t>
+            </a:r>
+            <a:endParaRPr>
+              <a:solidFill>
+                <a:srgbClr val="434343"/>
+              </a:solidFill>
+            </a:endParaRPr>
+          </a:p>
+          <a:p>
+            <a:pPr indent="-342900" lvl="0" marL="457200" rtl="0" algn="l">
+              <a:spcBef>
+                <a:spcPts val="0"/>
+              </a:spcBef>
+              <a:spcAft>
+                <a:spcPts val="0"/>
+              </a:spcAft>
+              <a:buClr>
+                <a:srgbClr val="434343"/>
+              </a:buClr>
+              <a:buSzPts val="1800"/>
+              <a:buChar char="-"/>
+            </a:pPr>
+            <a:r>
+              <a:rPr lang="ru">
+                <a:solidFill>
+                  <a:srgbClr val="434343"/>
+                </a:solidFill>
+              </a:rPr>
+              <a:t>MST может не содержать минимальных ребер</a:t>
+            </a:r>
+            <a:endParaRPr>
+              <a:solidFill>
+                <a:srgbClr val="434343"/>
+              </a:solidFill>
+            </a:endParaRPr>
+          </a:p>
+        </p:txBody>
+      </p:sp>
+      <p:pic>
+        <p:nvPicPr>
+          <p:cNvPr id="79" name="Google Shape;79;p16"/>
+          <p:cNvPicPr preferRelativeResize="0"/>
+          <p:nvPr/>
+        </p:nvPicPr>
+        <p:blipFill>
+          <a:blip r:embed="rId3">
+            <a:alphaModFix/>
+          </a:blip>
+          <a:stretch>
+            <a:fillRect/>
+          </a:stretch>
+        </p:blipFill>
+        <p:spPr>
+          <a:xfrm>
+            <a:off x="5699950" y="955925"/>
+            <a:ext cx="3444050" cy="790575"/>
+          </a:xfrm>
+          <a:prstGeom prst="rect">
+            <a:avLst/>
+          </a:prstGeom>
+          <a:noFill/>
+          <a:ln>
+            <a:noFill/>
+          </a:ln>
+        </p:spPr>
+      </p:pic>
+    </p:spTree>
+  </p:cSld>
+  <p:clrMapOvr>
+    <a:masterClrMapping/>
+  </p:clrMapOvr>
+</p:sld>
+</file>
+
+<file path=ppt/slides/slide5.xml><?xml version="1.0" encoding="utf-8"?>
+<p:sld xmlns:a="http://schemas.openxmlformats.org/drawingml/2006/main" xmlns:r="http://schemas.openxmlformats.org/officeDocument/2006/relationships" xmlns:mc="http://schemas.openxmlformats.org/markup-compatibility/2006" xmlns:mv="urn:schemas-microsoft-com:mac:vml" xmlns:p="http://schemas.openxmlformats.org/presentationml/2006/main" xmlns:c="http://schemas.openxmlformats.org/drawingml/2006/chart" xmlns:dgm="http://schemas.openxmlformats.org/drawingml/2006/diagram" xmlns:o="urn:schemas-microsoft-com:office:office" xmlns:v="urn:schemas-microsoft-com:vml" xmlns:pvml="urn:schemas-microsoft-com:office:powerpoint" xmlns:com="http://schemas.openxmlformats.org/drawingml/2006/compatibility" xmlns:p14="http://schemas.microsoft.com/office/powerpoint/2010/main" xmlns:p15="http://schemas.microsoft.com/office/powerpoint/2012/main" xmlns:ahyp="http://schemas.microsoft.com/office/drawing/2018/hyperlinkcolor">
+  <p:cSld>
+    <p:spTree>
+      <p:nvGrpSpPr>
+        <p:cNvPr id="83" name="Shape 83"/>
+        <p:cNvGrpSpPr/>
+        <p:nvPr/>
+      </p:nvGrpSpPr>
+      <p:grpSpPr>
+        <a:xfrm>
+          <a:off x="0" y="0"/>
+          <a:ext cx="0" cy="0"/>
+          <a:chOff x="0" y="0"/>
+          <a:chExt cx="0" cy="0"/>
+        </a:xfrm>
+      </p:grpSpPr>
+      <p:sp>
+        <p:nvSpPr>
+          <p:cNvPr id="84" name="Google Shape;84;p17"/>
+          <p:cNvSpPr txBox="1"/>
+          <p:nvPr>
+            <p:ph type="title"/>
+          </p:nvPr>
+        </p:nvSpPr>
+        <p:spPr>
+          <a:xfrm>
+            <a:off x="311700" y="292850"/>
+            <a:ext cx="8520600" cy="801000"/>
+          </a:xfrm>
+          <a:prstGeom prst="rect">
+            <a:avLst/>
+          </a:prstGeom>
+        </p:spPr>
+        <p:txBody>
+          <a:bodyPr anchorCtr="0" anchor="t" bIns="91425" lIns="91425" spcFirstLastPara="1" rIns="91425" wrap="square" tIns="91425">
+            <a:normAutofit fontScale="90000"/>
+          </a:bodyPr>
+          <a:lstStyle/>
+          <a:p>
+            <a:pPr indent="0" lvl="0" marL="0" rtl="0" algn="l">
+              <a:spcBef>
+                <a:spcPts val="0"/>
+              </a:spcBef>
+              <a:spcAft>
+                <a:spcPts val="0"/>
+              </a:spcAft>
+              <a:buNone/>
+            </a:pPr>
+            <a:r>
+              <a:rPr lang="ru"/>
               <a:t>Описание алгоритма</a:t>
             </a:r>
             <a:endParaRPr/>
@@ -7849,7 +8509,7 @@
       </p:sp>
       <p:sp>
         <p:nvSpPr>
-          <p:cNvPr id="78" name="Google Shape;78;p16"/>
+          <p:cNvPr id="85" name="Google Shape;85;p17"/>
           <p:cNvSpPr txBox="1"/>
           <p:nvPr>
             <p:ph idx="1" type="body"/>
@@ -8095,12 +8755,12 @@
 </p:sld>
 </file>
 
-<file path=ppt/slides/slide5.xml><?xml version="1.0" encoding="utf-8"?>
+<file path=ppt/slides/slide6.xml><?xml version="1.0" encoding="utf-8"?>
 <p:sld xmlns:a="http://schemas.openxmlformats.org/drawingml/2006/main" xmlns:r="http://schemas.openxmlformats.org/officeDocument/2006/relationships" xmlns:mc="http://schemas.openxmlformats.org/markup-compatibility/2006" xmlns:mv="urn:schemas-microsoft-com:mac:vml" xmlns:p="http://schemas.openxmlformats.org/presentationml/2006/main" xmlns:c="http://schemas.openxmlformats.org/drawingml/2006/chart" xmlns:dgm="http://schemas.openxmlformats.org/drawingml/2006/diagram" xmlns:o="urn:schemas-microsoft-com:office:office" xmlns:v="urn:schemas-microsoft-com:vml" xmlns:pvml="urn:schemas-microsoft-com:office:powerpoint" xmlns:com="http://schemas.openxmlformats.org/drawingml/2006/compatibility" xmlns:p14="http://schemas.microsoft.com/office/powerpoint/2010/main" xmlns:p15="http://schemas.microsoft.com/office/powerpoint/2012/main" xmlns:ahyp="http://schemas.microsoft.com/office/drawing/2018/hyperlinkcolor">
   <p:cSld>
     <p:spTree>
       <p:nvGrpSpPr>
-        <p:cNvPr id="82" name="Shape 82"/>
+        <p:cNvPr id="89" name="Shape 89"/>
         <p:cNvGrpSpPr/>
         <p:nvPr/>
       </p:nvGrpSpPr>
@@ -8114,7 +8774,7 @@
       </p:grpSpPr>
       <p:sp>
         <p:nvSpPr>
-          <p:cNvPr id="83" name="Google Shape;83;p17"/>
+          <p:cNvPr id="90" name="Google Shape;90;p18"/>
           <p:cNvSpPr txBox="1"/>
           <p:nvPr>
             <p:ph type="title"/>
@@ -8154,7 +8814,7 @@
       </p:sp>
       <p:pic>
         <p:nvPicPr>
-          <p:cNvPr id="84" name="Google Shape;84;p17"/>
+          <p:cNvPr id="91" name="Google Shape;91;p18"/>
           <p:cNvPicPr preferRelativeResize="0"/>
           <p:nvPr/>
         </p:nvPicPr>
@@ -8182,7 +8842,7 @@
       </p:pic>
       <p:pic>
         <p:nvPicPr>
-          <p:cNvPr id="85" name="Google Shape;85;p17"/>
+          <p:cNvPr id="92" name="Google Shape;92;p18"/>
           <p:cNvPicPr preferRelativeResize="0"/>
           <p:nvPr/>
         </p:nvPicPr>
@@ -8210,7 +8870,7 @@
       </p:pic>
       <p:sp>
         <p:nvSpPr>
-          <p:cNvPr id="86" name="Google Shape;86;p17"/>
+          <p:cNvPr id="93" name="Google Shape;93;p18"/>
           <p:cNvSpPr txBox="1"/>
           <p:nvPr/>
         </p:nvSpPr>
@@ -8268,7 +8928,7 @@
       </p:sp>
       <p:sp>
         <p:nvSpPr>
-          <p:cNvPr id="87" name="Google Shape;87;p17"/>
+          <p:cNvPr id="94" name="Google Shape;94;p18"/>
           <p:cNvSpPr txBox="1"/>
           <p:nvPr/>
         </p:nvSpPr>
@@ -8332,12 +8992,12 @@
 </p:sld>
 </file>
 
-<file path=ppt/slides/slide6.xml><?xml version="1.0" encoding="utf-8"?>
+<file path=ppt/slides/slide7.xml><?xml version="1.0" encoding="utf-8"?>
 <p:sld xmlns:a="http://schemas.openxmlformats.org/drawingml/2006/main" xmlns:r="http://schemas.openxmlformats.org/officeDocument/2006/relationships" xmlns:mc="http://schemas.openxmlformats.org/markup-compatibility/2006" xmlns:mv="urn:schemas-microsoft-com:mac:vml" xmlns:p="http://schemas.openxmlformats.org/presentationml/2006/main" xmlns:c="http://schemas.openxmlformats.org/drawingml/2006/chart" xmlns:dgm="http://schemas.openxmlformats.org/drawingml/2006/diagram" xmlns:o="urn:schemas-microsoft-com:office:office" xmlns:v="urn:schemas-microsoft-com:vml" xmlns:pvml="urn:schemas-microsoft-com:office:powerpoint" xmlns:com="http://schemas.openxmlformats.org/drawingml/2006/compatibility" xmlns:p14="http://schemas.microsoft.com/office/powerpoint/2010/main" xmlns:p15="http://schemas.microsoft.com/office/powerpoint/2012/main" xmlns:ahyp="http://schemas.microsoft.com/office/drawing/2018/hyperlinkcolor">
   <p:cSld>
     <p:spTree>
       <p:nvGrpSpPr>
-        <p:cNvPr id="91" name="Shape 91"/>
+        <p:cNvPr id="98" name="Shape 98"/>
         <p:cNvGrpSpPr/>
         <p:nvPr/>
       </p:nvGrpSpPr>
@@ -8351,7 +9011,7 @@
       </p:grpSpPr>
       <p:sp>
         <p:nvSpPr>
-          <p:cNvPr id="92" name="Google Shape;92;p18"/>
+          <p:cNvPr id="99" name="Google Shape;99;p19"/>
           <p:cNvSpPr txBox="1"/>
           <p:nvPr>
             <p:ph type="title"/>
@@ -8391,7 +9051,7 @@
       </p:sp>
       <p:pic>
         <p:nvPicPr>
-          <p:cNvPr id="93" name="Google Shape;93;p18"/>
+          <p:cNvPr id="100" name="Google Shape;100;p19"/>
           <p:cNvPicPr preferRelativeResize="0"/>
           <p:nvPr/>
         </p:nvPicPr>
@@ -8419,7 +9079,7 @@
       </p:pic>
       <p:pic>
         <p:nvPicPr>
-          <p:cNvPr id="94" name="Google Shape;94;p18"/>
+          <p:cNvPr id="101" name="Google Shape;101;p19"/>
           <p:cNvPicPr preferRelativeResize="0"/>
           <p:nvPr/>
         </p:nvPicPr>
@@ -8447,7 +9107,7 @@
       </p:pic>
       <p:sp>
         <p:nvSpPr>
-          <p:cNvPr id="95" name="Google Shape;95;p18"/>
+          <p:cNvPr id="102" name="Google Shape;102;p19"/>
           <p:cNvSpPr txBox="1"/>
           <p:nvPr/>
         </p:nvSpPr>
@@ -8505,7 +9165,7 @@
       </p:sp>
       <p:sp>
         <p:nvSpPr>
-          <p:cNvPr id="96" name="Google Shape;96;p18"/>
+          <p:cNvPr id="103" name="Google Shape;103;p19"/>
           <p:cNvSpPr txBox="1"/>
           <p:nvPr/>
         </p:nvSpPr>
@@ -8569,12 +9229,12 @@
 </p:sld>
 </file>
 
-<file path=ppt/slides/slide7.xml><?xml version="1.0" encoding="utf-8"?>
+<file path=ppt/slides/slide8.xml><?xml version="1.0" encoding="utf-8"?>
 <p:sld xmlns:a="http://schemas.openxmlformats.org/drawingml/2006/main" xmlns:r="http://schemas.openxmlformats.org/officeDocument/2006/relationships" xmlns:mc="http://schemas.openxmlformats.org/markup-compatibility/2006" xmlns:mv="urn:schemas-microsoft-com:mac:vml" xmlns:p="http://schemas.openxmlformats.org/presentationml/2006/main" xmlns:c="http://schemas.openxmlformats.org/drawingml/2006/chart" xmlns:dgm="http://schemas.openxmlformats.org/drawingml/2006/diagram" xmlns:o="urn:schemas-microsoft-com:office:office" xmlns:v="urn:schemas-microsoft-com:vml" xmlns:pvml="urn:schemas-microsoft-com:office:powerpoint" xmlns:com="http://schemas.openxmlformats.org/drawingml/2006/compatibility" xmlns:p14="http://schemas.microsoft.com/office/powerpoint/2010/main" xmlns:p15="http://schemas.microsoft.com/office/powerpoint/2012/main" xmlns:ahyp="http://schemas.microsoft.com/office/drawing/2018/hyperlinkcolor">
   <p:cSld>
     <p:spTree>
       <p:nvGrpSpPr>
-        <p:cNvPr id="100" name="Shape 100"/>
+        <p:cNvPr id="107" name="Shape 107"/>
         <p:cNvGrpSpPr/>
         <p:nvPr/>
       </p:nvGrpSpPr>
@@ -8588,7 +9248,7 @@
       </p:grpSpPr>
       <p:sp>
         <p:nvSpPr>
-          <p:cNvPr id="101" name="Google Shape;101;p19"/>
+          <p:cNvPr id="108" name="Google Shape;108;p20"/>
           <p:cNvSpPr txBox="1"/>
           <p:nvPr>
             <p:ph type="title"/>
@@ -8628,7 +9288,7 @@
       </p:sp>
       <p:pic>
         <p:nvPicPr>
-          <p:cNvPr id="102" name="Google Shape;102;p19"/>
+          <p:cNvPr id="109" name="Google Shape;109;p20"/>
           <p:cNvPicPr preferRelativeResize="0"/>
           <p:nvPr/>
         </p:nvPicPr>
@@ -8656,7 +9316,7 @@
       </p:pic>
       <p:pic>
         <p:nvPicPr>
-          <p:cNvPr id="103" name="Google Shape;103;p19"/>
+          <p:cNvPr id="110" name="Google Shape;110;p20"/>
           <p:cNvPicPr preferRelativeResize="0"/>
           <p:nvPr/>
         </p:nvPicPr>
@@ -8684,7 +9344,7 @@
       </p:pic>
       <p:sp>
         <p:nvSpPr>
-          <p:cNvPr id="104" name="Google Shape;104;p19"/>
+          <p:cNvPr id="111" name="Google Shape;111;p20"/>
           <p:cNvSpPr txBox="1"/>
           <p:nvPr/>
         </p:nvSpPr>
@@ -8742,7 +9402,7 @@
       </p:sp>
       <p:sp>
         <p:nvSpPr>
-          <p:cNvPr id="105" name="Google Shape;105;p19"/>
+          <p:cNvPr id="112" name="Google Shape;112;p20"/>
           <p:cNvSpPr txBox="1"/>
           <p:nvPr/>
         </p:nvSpPr>
@@ -8785,157 +9445,6 @@
                 <a:sym typeface="Source Code Pro"/>
               </a:rPr>
               <a:t>Разворачиваем цикл</a:t>
-            </a:r>
-            <a:endParaRPr sz="1800">
-              <a:solidFill>
-                <a:schemeClr val="dk2"/>
-              </a:solidFill>
-              <a:latin typeface="Source Code Pro"/>
-              <a:ea typeface="Source Code Pro"/>
-              <a:cs typeface="Source Code Pro"/>
-              <a:sym typeface="Source Code Pro"/>
-            </a:endParaRPr>
-          </a:p>
-        </p:txBody>
-      </p:sp>
-    </p:spTree>
-  </p:cSld>
-  <p:clrMapOvr>
-    <a:masterClrMapping/>
-  </p:clrMapOvr>
-</p:sld>
-</file>
-
-<file path=ppt/slides/slide8.xml><?xml version="1.0" encoding="utf-8"?>
-<p:sld xmlns:a="http://schemas.openxmlformats.org/drawingml/2006/main" xmlns:r="http://schemas.openxmlformats.org/officeDocument/2006/relationships" xmlns:mc="http://schemas.openxmlformats.org/markup-compatibility/2006" xmlns:mv="urn:schemas-microsoft-com:mac:vml" xmlns:p="http://schemas.openxmlformats.org/presentationml/2006/main" xmlns:c="http://schemas.openxmlformats.org/drawingml/2006/chart" xmlns:dgm="http://schemas.openxmlformats.org/drawingml/2006/diagram" xmlns:o="urn:schemas-microsoft-com:office:office" xmlns:v="urn:schemas-microsoft-com:vml" xmlns:pvml="urn:schemas-microsoft-com:office:powerpoint" xmlns:com="http://schemas.openxmlformats.org/drawingml/2006/compatibility" xmlns:p14="http://schemas.microsoft.com/office/powerpoint/2010/main" xmlns:p15="http://schemas.microsoft.com/office/powerpoint/2012/main" xmlns:ahyp="http://schemas.microsoft.com/office/drawing/2018/hyperlinkcolor">
-  <p:cSld>
-    <p:spTree>
-      <p:nvGrpSpPr>
-        <p:cNvPr id="109" name="Shape 109"/>
-        <p:cNvGrpSpPr/>
-        <p:nvPr/>
-      </p:nvGrpSpPr>
-      <p:grpSpPr>
-        <a:xfrm>
-          <a:off x="0" y="0"/>
-          <a:ext cx="0" cy="0"/>
-          <a:chOff x="0" y="0"/>
-          <a:chExt cx="0" cy="0"/>
-        </a:xfrm>
-      </p:grpSpPr>
-      <p:sp>
-        <p:nvSpPr>
-          <p:cNvPr id="110" name="Google Shape;110;p20"/>
-          <p:cNvSpPr txBox="1"/>
-          <p:nvPr>
-            <p:ph type="title"/>
-          </p:nvPr>
-        </p:nvSpPr>
-        <p:spPr>
-          <a:xfrm>
-            <a:off x="311700" y="292850"/>
-            <a:ext cx="8520600" cy="801000"/>
-          </a:xfrm>
-          <a:prstGeom prst="rect">
-            <a:avLst/>
-          </a:prstGeom>
-        </p:spPr>
-        <p:txBody>
-          <a:bodyPr anchorCtr="0" anchor="t" bIns="91425" lIns="91425" spcFirstLastPara="1" rIns="91425" wrap="square" tIns="91425">
-            <a:normAutofit fontScale="90000"/>
-          </a:bodyPr>
-          <a:lstStyle/>
-          <a:p>
-            <a:pPr indent="0" lvl="0" marL="0" rtl="0" algn="l">
-              <a:spcBef>
-                <a:spcPts val="0"/>
-              </a:spcBef>
-              <a:spcAft>
-                <a:spcPts val="0"/>
-              </a:spcAft>
-              <a:buNone/>
-            </a:pPr>
-            <a:r>
-              <a:rPr lang="ru"/>
-              <a:t>Демонстрация</a:t>
-            </a:r>
-            <a:endParaRPr/>
-          </a:p>
-        </p:txBody>
-      </p:sp>
-      <p:pic>
-        <p:nvPicPr>
-          <p:cNvPr id="111" name="Google Shape;111;p20"/>
-          <p:cNvPicPr preferRelativeResize="0"/>
-          <p:nvPr/>
-        </p:nvPicPr>
-        <p:blipFill>
-          <a:blip r:embed="rId3">
-            <a:alphaModFix/>
-          </a:blip>
-          <a:stretch>
-            <a:fillRect/>
-          </a:stretch>
-        </p:blipFill>
-        <p:spPr>
-          <a:xfrm>
-            <a:off x="311700" y="1093850"/>
-            <a:ext cx="4291399" cy="3437450"/>
-          </a:xfrm>
-          <a:prstGeom prst="rect">
-            <a:avLst/>
-          </a:prstGeom>
-          <a:noFill/>
-          <a:ln>
-            <a:noFill/>
-          </a:ln>
-        </p:spPr>
-      </p:pic>
-      <p:sp>
-        <p:nvSpPr>
-          <p:cNvPr id="112" name="Google Shape;112;p20"/>
-          <p:cNvSpPr txBox="1"/>
-          <p:nvPr/>
-        </p:nvSpPr>
-        <p:spPr>
-          <a:xfrm>
-            <a:off x="4831313" y="1142075"/>
-            <a:ext cx="3279600" cy="1015800"/>
-          </a:xfrm>
-          <a:prstGeom prst="rect">
-            <a:avLst/>
-          </a:prstGeom>
-          <a:noFill/>
-          <a:ln>
-            <a:noFill/>
-          </a:ln>
-        </p:spPr>
-        <p:txBody>
-          <a:bodyPr anchorCtr="0" anchor="t" bIns="91425" lIns="91425" spcFirstLastPara="1" rIns="91425" wrap="square" tIns="91425">
-            <a:spAutoFit/>
-          </a:bodyPr>
-          <a:lstStyle/>
-          <a:p>
-            <a:pPr indent="0" lvl="0" marL="0" rtl="0" algn="l">
-              <a:spcBef>
-                <a:spcPts val="0"/>
-              </a:spcBef>
-              <a:spcAft>
-                <a:spcPts val="0"/>
-              </a:spcAft>
-              <a:buNone/>
-            </a:pPr>
-            <a:r>
-              <a:rPr lang="ru" sz="1800">
-                <a:solidFill>
-                  <a:schemeClr val="dk2"/>
-                </a:solidFill>
-                <a:latin typeface="Source Code Pro"/>
-                <a:ea typeface="Source Code Pro"/>
-                <a:cs typeface="Source Code Pro"/>
-                <a:sym typeface="Source Code Pro"/>
-              </a:rPr>
-              <a:t>Разрываем цикл, и получаем MST в исходном графе. </a:t>
             </a:r>
             <a:endParaRPr sz="1800">
               <a:solidFill>
@@ -9008,32 +9517,62 @@
             </a:pPr>
             <a:r>
               <a:rPr lang="ru"/>
-              <a:t>Асимптотика</a:t>
+              <a:t>Демонстрация</a:t>
             </a:r>
             <a:endParaRPr/>
           </a:p>
         </p:txBody>
       </p:sp>
-      <p:sp>
-        <p:nvSpPr>
+      <p:pic>
+        <p:nvPicPr>
           <p:cNvPr id="118" name="Google Shape;118;p21"/>
-          <p:cNvSpPr txBox="1"/>
-          <p:nvPr>
-            <p:ph idx="1" type="body"/>
-          </p:nvPr>
-        </p:nvSpPr>
+          <p:cNvPicPr preferRelativeResize="0"/>
+          <p:nvPr/>
+        </p:nvPicPr>
+        <p:blipFill>
+          <a:blip r:embed="rId3">
+            <a:alphaModFix/>
+          </a:blip>
+          <a:stretch>
+            <a:fillRect/>
+          </a:stretch>
+        </p:blipFill>
         <p:spPr>
           <a:xfrm>
-            <a:off x="311700" y="1228675"/>
-            <a:ext cx="8520600" cy="3340200"/>
+            <a:off x="311700" y="1093850"/>
+            <a:ext cx="4291399" cy="3437450"/>
           </a:xfrm>
           <a:prstGeom prst="rect">
             <a:avLst/>
           </a:prstGeom>
+          <a:noFill/>
+          <a:ln>
+            <a:noFill/>
+          </a:ln>
+        </p:spPr>
+      </p:pic>
+      <p:sp>
+        <p:nvSpPr>
+          <p:cNvPr id="119" name="Google Shape;119;p21"/>
+          <p:cNvSpPr txBox="1"/>
+          <p:nvPr/>
+        </p:nvSpPr>
+        <p:spPr>
+          <a:xfrm>
+            <a:off x="4831313" y="1142075"/>
+            <a:ext cx="3279600" cy="1015800"/>
+          </a:xfrm>
+          <a:prstGeom prst="rect">
+            <a:avLst/>
+          </a:prstGeom>
+          <a:noFill/>
+          <a:ln>
+            <a:noFill/>
+          </a:ln>
         </p:spPr>
         <p:txBody>
           <a:bodyPr anchorCtr="0" anchor="t" bIns="91425" lIns="91425" spcFirstLastPara="1" rIns="91425" wrap="square" tIns="91425">
-            <a:normAutofit/>
+            <a:spAutoFit/>
           </a:bodyPr>
           <a:lstStyle/>
           <a:p>
@@ -9047,80 +9586,26 @@
               <a:buNone/>
             </a:pPr>
             <a:r>
-              <a:rPr lang="ru"/>
-              <a:t>Время работы алгоритма составляет O</a:t>
+              <a:rPr lang="ru" sz="1800">
+                <a:solidFill>
+                  <a:schemeClr val="dk2"/>
+                </a:solidFill>
+                <a:latin typeface="Source Code Pro"/>
+                <a:ea typeface="Source Code Pro"/>
+                <a:cs typeface="Source Code Pro"/>
+                <a:sym typeface="Source Code Pro"/>
+              </a:rPr>
+              <a:t>Разрываем цикл, и получаем MST в исходном графе. </a:t>
             </a:r>
-            <a:r>
-              <a:rPr lang="ru"/>
-              <a:t>(EV) и по памяти O(EV)</a:t>
-            </a:r>
-            <a:endParaRPr/>
-          </a:p>
-          <a:p>
-            <a:pPr indent="0" lvl="0" marL="0" rtl="0" algn="l">
-              <a:spcBef>
-                <a:spcPts val="1200"/>
-              </a:spcBef>
-              <a:spcAft>
-                <a:spcPts val="0"/>
-              </a:spcAft>
-              <a:buNone/>
-            </a:pPr>
-            <a:r>
-              <a:rPr lang="ru"/>
-              <a:t>Можно ли быстрее?</a:t>
-            </a:r>
-            <a:endParaRPr/>
-          </a:p>
-          <a:p>
-            <a:pPr indent="0" lvl="0" marL="0" rtl="0" algn="l">
-              <a:spcBef>
-                <a:spcPts val="1200"/>
-              </a:spcBef>
-              <a:spcAft>
-                <a:spcPts val="0"/>
-              </a:spcAft>
-              <a:buNone/>
-            </a:pPr>
-            <a:r>
-              <a:rPr lang="ru"/>
-              <a:t>Да, можно, существуют:</a:t>
-            </a:r>
-            <a:endParaRPr/>
-          </a:p>
-          <a:p>
-            <a:pPr indent="-342900" lvl="0" marL="457200" rtl="0" algn="l">
-              <a:spcBef>
-                <a:spcPts val="1200"/>
-              </a:spcBef>
-              <a:spcAft>
-                <a:spcPts val="0"/>
-              </a:spcAft>
-              <a:buSzPts val="1800"/>
-              <a:buChar char="-"/>
-            </a:pPr>
-            <a:r>
-              <a:rPr lang="ru"/>
-              <a:t>Реализация Тарьяна O(min(ElogV, V^2))</a:t>
-            </a:r>
-            <a:endParaRPr/>
-          </a:p>
-          <a:p>
-            <a:pPr indent="-342900" lvl="0" marL="457200" rtl="0" algn="l">
-              <a:spcBef>
-                <a:spcPts val="0"/>
-              </a:spcBef>
-              <a:spcAft>
-                <a:spcPts val="0"/>
-              </a:spcAft>
-              <a:buSzPts val="1800"/>
-              <a:buChar char="-"/>
-            </a:pPr>
-            <a:r>
-              <a:rPr lang="ru"/>
-              <a:t>В 1986 Габов, Галиль, Спенсер, Комптон и Тарьян предложили более быструю реализацию со временем работы O(E + V logV)</a:t>
-            </a:r>
-            <a:endParaRPr/>
+            <a:endParaRPr sz="1800">
+              <a:solidFill>
+                <a:schemeClr val="dk2"/>
+              </a:solidFill>
+              <a:latin typeface="Source Code Pro"/>
+              <a:ea typeface="Source Code Pro"/>
+              <a:cs typeface="Source Code Pro"/>
+              <a:sym typeface="Source Code Pro"/>
+            </a:endParaRPr>
           </a:p>
         </p:txBody>
       </p:sp>

</xml_diff>